<commit_message>
Added simulation, images for fig1 and fig2
</commit_message>
<xml_diff>
--- a/Images/needlefab.pptx
+++ b/Images/needlefab.pptx
@@ -14,6 +14,7 @@
     <p:sldId id="261" r:id="rId8"/>
     <p:sldId id="262" r:id="rId9"/>
     <p:sldId id="263" r:id="rId10"/>
+    <p:sldId id="265" r:id="rId11"/>
   </p:sldIdLst>
   <p:sldSz cx="12192000" cy="6858000"/>
   <p:notesSz cx="6858000" cy="9144000"/>
@@ -120,6 +121,153 @@
 </p:presentation>
 </file>
 
+<file path=ppt/revisionInfo.xml><?xml version="1.0" encoding="utf-8"?>
+<p1510:revInfo xmlns:a="http://schemas.openxmlformats.org/drawingml/2006/main" xmlns:r="http://schemas.openxmlformats.org/officeDocument/2006/relationships" xmlns:p1510="http://schemas.microsoft.com/office/powerpoint/2015/10/main">
+  <p1510:revLst>
+    <p1510:client id="{ADD493D8-69BA-470A-B53A-2BD2F4ADACA3}" v="1" dt="2021-02-02T22:04:17.394"/>
+  </p1510:revLst>
+</p1510:revInfo>
+</file>
+
+<file path=ppt/changesInfos/changesInfo1.xml><?xml version="1.0" encoding="utf-8"?>
+<pc:chgInfo xmlns:a="http://schemas.openxmlformats.org/drawingml/2006/main" xmlns:r="http://schemas.openxmlformats.org/officeDocument/2006/relationships" xmlns:ac="http://schemas.microsoft.com/office/drawing/2013/main/command" xmlns:pc="http://schemas.microsoft.com/office/powerpoint/2013/main/command">
+  <pc:docChgLst>
+    <pc:chgData name="Nikhil Kotibhaskar" userId="ae3badbd-7aaf-41d7-bf37-a015832cbfa1" providerId="ADAL" clId="{ADD493D8-69BA-470A-B53A-2BD2F4ADACA3}"/>
+    <pc:docChg chg="custSel modSld">
+      <pc:chgData name="Nikhil Kotibhaskar" userId="ae3badbd-7aaf-41d7-bf37-a015832cbfa1" providerId="ADAL" clId="{ADD493D8-69BA-470A-B53A-2BD2F4ADACA3}" dt="2021-02-02T22:04:21.204" v="2" actId="21"/>
+      <pc:docMkLst>
+        <pc:docMk/>
+      </pc:docMkLst>
+      <pc:sldChg chg="addSp delSp modSp mod">
+        <pc:chgData name="Nikhil Kotibhaskar" userId="ae3badbd-7aaf-41d7-bf37-a015832cbfa1" providerId="ADAL" clId="{ADD493D8-69BA-470A-B53A-2BD2F4ADACA3}" dt="2021-02-02T22:04:21.204" v="2" actId="21"/>
+        <pc:sldMkLst>
+          <pc:docMk/>
+          <pc:sldMk cId="233214969" sldId="265"/>
+        </pc:sldMkLst>
+        <pc:picChg chg="add del mod">
+          <ac:chgData name="Nikhil Kotibhaskar" userId="ae3badbd-7aaf-41d7-bf37-a015832cbfa1" providerId="ADAL" clId="{ADD493D8-69BA-470A-B53A-2BD2F4ADACA3}" dt="2021-02-02T22:04:21.204" v="2" actId="21"/>
+          <ac:picMkLst>
+            <pc:docMk/>
+            <pc:sldMk cId="233214969" sldId="265"/>
+            <ac:picMk id="10" creationId="{DCC0D645-85AE-4F73-ABEA-0097EA960FAE}"/>
+          </ac:picMkLst>
+        </pc:picChg>
+      </pc:sldChg>
+    </pc:docChg>
+  </pc:docChgLst>
+  <pc:docChgLst>
+    <pc:chgData name="Nikhil Kotibhaskar" userId="ae3badbd-7aaf-41d7-bf37-a015832cbfa1" providerId="ADAL" clId="{C245B996-3D12-4650-9C2C-314CDD7C7DFF}"/>
+    <pc:docChg chg="custSel addSld modSld">
+      <pc:chgData name="Nikhil Kotibhaskar" userId="ae3badbd-7aaf-41d7-bf37-a015832cbfa1" providerId="ADAL" clId="{C245B996-3D12-4650-9C2C-314CDD7C7DFF}" dt="2020-12-18T22:41:54.143" v="19"/>
+      <pc:docMkLst>
+        <pc:docMk/>
+      </pc:docMkLst>
+      <pc:sldChg chg="modSp">
+        <pc:chgData name="Nikhil Kotibhaskar" userId="ae3badbd-7aaf-41d7-bf37-a015832cbfa1" providerId="ADAL" clId="{C245B996-3D12-4650-9C2C-314CDD7C7DFF}" dt="2020-12-18T22:33:15.616" v="18" actId="207"/>
+        <pc:sldMkLst>
+          <pc:docMk/>
+          <pc:sldMk cId="3703919774" sldId="262"/>
+        </pc:sldMkLst>
+        <pc:spChg chg="mod">
+          <ac:chgData name="Nikhil Kotibhaskar" userId="ae3badbd-7aaf-41d7-bf37-a015832cbfa1" providerId="ADAL" clId="{C245B996-3D12-4650-9C2C-314CDD7C7DFF}" dt="2020-12-18T22:33:15.616" v="18" actId="207"/>
+          <ac:spMkLst>
+            <pc:docMk/>
+            <pc:sldMk cId="3703919774" sldId="262"/>
+            <ac:spMk id="5" creationId="{BC4FD3FD-A808-458B-8152-1F54BF79C47B}"/>
+          </ac:spMkLst>
+        </pc:spChg>
+        <pc:spChg chg="mod">
+          <ac:chgData name="Nikhil Kotibhaskar" userId="ae3badbd-7aaf-41d7-bf37-a015832cbfa1" providerId="ADAL" clId="{C245B996-3D12-4650-9C2C-314CDD7C7DFF}" dt="2020-12-18T22:33:09.113" v="17" actId="207"/>
+          <ac:spMkLst>
+            <pc:docMk/>
+            <pc:sldMk cId="3703919774" sldId="262"/>
+            <ac:spMk id="7" creationId="{3A48EB17-53F5-4FE5-9AEF-EB053599326F}"/>
+          </ac:spMkLst>
+        </pc:spChg>
+        <pc:picChg chg="mod">
+          <ac:chgData name="Nikhil Kotibhaskar" userId="ae3badbd-7aaf-41d7-bf37-a015832cbfa1" providerId="ADAL" clId="{C245B996-3D12-4650-9C2C-314CDD7C7DFF}" dt="2020-12-18T22:32:00.223" v="10" actId="732"/>
+          <ac:picMkLst>
+            <pc:docMk/>
+            <pc:sldMk cId="3703919774" sldId="262"/>
+            <ac:picMk id="4" creationId="{E946925A-52AC-4515-9DC6-45DD27EEF64A}"/>
+          </ac:picMkLst>
+        </pc:picChg>
+        <pc:picChg chg="mod">
+          <ac:chgData name="Nikhil Kotibhaskar" userId="ae3badbd-7aaf-41d7-bf37-a015832cbfa1" providerId="ADAL" clId="{C245B996-3D12-4650-9C2C-314CDD7C7DFF}" dt="2020-12-18T22:32:38.544" v="16" actId="1076"/>
+          <ac:picMkLst>
+            <pc:docMk/>
+            <pc:sldMk cId="3703919774" sldId="262"/>
+            <ac:picMk id="6" creationId="{7A48B446-28F2-470A-8555-9E565384719B}"/>
+          </ac:picMkLst>
+        </pc:picChg>
+      </pc:sldChg>
+      <pc:sldChg chg="addSp delSp modSp">
+        <pc:chgData name="Nikhil Kotibhaskar" userId="ae3badbd-7aaf-41d7-bf37-a015832cbfa1" providerId="ADAL" clId="{C245B996-3D12-4650-9C2C-314CDD7C7DFF}" dt="2020-12-18T22:30:48.854" v="9" actId="1076"/>
+        <pc:sldMkLst>
+          <pc:docMk/>
+          <pc:sldMk cId="2573312664" sldId="264"/>
+        </pc:sldMkLst>
+        <pc:spChg chg="del">
+          <ac:chgData name="Nikhil Kotibhaskar" userId="ae3badbd-7aaf-41d7-bf37-a015832cbfa1" providerId="ADAL" clId="{C245B996-3D12-4650-9C2C-314CDD7C7DFF}" dt="2020-12-18T22:27:30.391" v="1" actId="478"/>
+          <ac:spMkLst>
+            <pc:docMk/>
+            <pc:sldMk cId="2573312664" sldId="264"/>
+            <ac:spMk id="8" creationId="{4ECF0F7D-AD3B-4DB8-B013-EA55D2526365}"/>
+          </ac:spMkLst>
+        </pc:spChg>
+        <pc:spChg chg="del">
+          <ac:chgData name="Nikhil Kotibhaskar" userId="ae3badbd-7aaf-41d7-bf37-a015832cbfa1" providerId="ADAL" clId="{C245B996-3D12-4650-9C2C-314CDD7C7DFF}" dt="2020-12-18T22:27:30.391" v="1" actId="478"/>
+          <ac:spMkLst>
+            <pc:docMk/>
+            <pc:sldMk cId="2573312664" sldId="264"/>
+            <ac:spMk id="9" creationId="{AC730AB3-492C-4BA0-B9BA-CF169655F2D3}"/>
+          </ac:spMkLst>
+        </pc:spChg>
+        <pc:spChg chg="del">
+          <ac:chgData name="Nikhil Kotibhaskar" userId="ae3badbd-7aaf-41d7-bf37-a015832cbfa1" providerId="ADAL" clId="{C245B996-3D12-4650-9C2C-314CDD7C7DFF}" dt="2020-12-18T22:27:30.391" v="1" actId="478"/>
+          <ac:spMkLst>
+            <pc:docMk/>
+            <pc:sldMk cId="2573312664" sldId="264"/>
+            <ac:spMk id="10" creationId="{0E8BF341-1E0F-4CD1-B0B0-C20FB57D1F08}"/>
+          </ac:spMkLst>
+        </pc:spChg>
+        <pc:picChg chg="add del mod">
+          <ac:chgData name="Nikhil Kotibhaskar" userId="ae3badbd-7aaf-41d7-bf37-a015832cbfa1" providerId="ADAL" clId="{C245B996-3D12-4650-9C2C-314CDD7C7DFF}" dt="2020-12-18T22:30:41.746" v="6" actId="478"/>
+          <ac:picMkLst>
+            <pc:docMk/>
+            <pc:sldMk cId="2573312664" sldId="264"/>
+            <ac:picMk id="3" creationId="{1F8FC983-A395-4134-A7C9-6F8D93799599}"/>
+          </ac:picMkLst>
+        </pc:picChg>
+        <pc:picChg chg="del">
+          <ac:chgData name="Nikhil Kotibhaskar" userId="ae3badbd-7aaf-41d7-bf37-a015832cbfa1" providerId="ADAL" clId="{C245B996-3D12-4650-9C2C-314CDD7C7DFF}" dt="2020-12-18T22:27:25.150" v="0" actId="478"/>
+          <ac:picMkLst>
+            <pc:docMk/>
+            <pc:sldMk cId="2573312664" sldId="264"/>
+            <ac:picMk id="5" creationId="{77747B92-B550-47F2-8286-995D8DCC58E2}"/>
+          </ac:picMkLst>
+        </pc:picChg>
+        <pc:picChg chg="add mod">
+          <ac:chgData name="Nikhil Kotibhaskar" userId="ae3badbd-7aaf-41d7-bf37-a015832cbfa1" providerId="ADAL" clId="{C245B996-3D12-4650-9C2C-314CDD7C7DFF}" dt="2020-12-18T22:30:48.854" v="9" actId="1076"/>
+          <ac:picMkLst>
+            <pc:docMk/>
+            <pc:sldMk cId="2573312664" sldId="264"/>
+            <ac:picMk id="7" creationId="{ED33DD30-6B4E-4292-A7A1-316EB4C2C526}"/>
+          </ac:picMkLst>
+        </pc:picChg>
+      </pc:sldChg>
+      <pc:sldChg chg="add">
+        <pc:chgData name="Nikhil Kotibhaskar" userId="ae3badbd-7aaf-41d7-bf37-a015832cbfa1" providerId="ADAL" clId="{C245B996-3D12-4650-9C2C-314CDD7C7DFF}" dt="2020-12-18T22:41:54.143" v="19"/>
+        <pc:sldMkLst>
+          <pc:docMk/>
+          <pc:sldMk cId="233214969" sldId="265"/>
+        </pc:sldMkLst>
+      </pc:sldChg>
+    </pc:docChg>
+  </pc:docChgLst>
+</pc:chgInfo>
+</file>
+
 <file path=ppt/slideLayouts/slideLayout1.xml><?xml version="1.0" encoding="utf-8"?>
 <p:sldLayout xmlns:a="http://schemas.openxmlformats.org/drawingml/2006/main" xmlns:r="http://schemas.openxmlformats.org/officeDocument/2006/relationships" xmlns:p="http://schemas.openxmlformats.org/presentationml/2006/main" type="title" preserve="1">
   <p:cSld name="Title Slide">
@@ -269,7 +417,7 @@
           <a:p>
             <a:fld id="{9D5F5360-621C-4463-9F2F-973486E31BC6}" type="datetimeFigureOut">
               <a:rPr lang="en-CA" smtClean="0"/>
-              <a:t>2020-03-30</a:t>
+              <a:t>2021-02-02</a:t>
             </a:fld>
             <a:endParaRPr lang="en-CA"/>
           </a:p>
@@ -469,7 +617,7 @@
           <a:p>
             <a:fld id="{9D5F5360-621C-4463-9F2F-973486E31BC6}" type="datetimeFigureOut">
               <a:rPr lang="en-CA" smtClean="0"/>
-              <a:t>2020-03-30</a:t>
+              <a:t>2021-02-02</a:t>
             </a:fld>
             <a:endParaRPr lang="en-CA"/>
           </a:p>
@@ -679,7 +827,7 @@
           <a:p>
             <a:fld id="{9D5F5360-621C-4463-9F2F-973486E31BC6}" type="datetimeFigureOut">
               <a:rPr lang="en-CA" smtClean="0"/>
-              <a:t>2020-03-30</a:t>
+              <a:t>2021-02-02</a:t>
             </a:fld>
             <a:endParaRPr lang="en-CA"/>
           </a:p>
@@ -879,7 +1027,7 @@
           <a:p>
             <a:fld id="{9D5F5360-621C-4463-9F2F-973486E31BC6}" type="datetimeFigureOut">
               <a:rPr lang="en-CA" smtClean="0"/>
-              <a:t>2020-03-30</a:t>
+              <a:t>2021-02-02</a:t>
             </a:fld>
             <a:endParaRPr lang="en-CA"/>
           </a:p>
@@ -1155,7 +1303,7 @@
           <a:p>
             <a:fld id="{9D5F5360-621C-4463-9F2F-973486E31BC6}" type="datetimeFigureOut">
               <a:rPr lang="en-CA" smtClean="0"/>
-              <a:t>2020-03-30</a:t>
+              <a:t>2021-02-02</a:t>
             </a:fld>
             <a:endParaRPr lang="en-CA"/>
           </a:p>
@@ -1423,7 +1571,7 @@
           <a:p>
             <a:fld id="{9D5F5360-621C-4463-9F2F-973486E31BC6}" type="datetimeFigureOut">
               <a:rPr lang="en-CA" smtClean="0"/>
-              <a:t>2020-03-30</a:t>
+              <a:t>2021-02-02</a:t>
             </a:fld>
             <a:endParaRPr lang="en-CA"/>
           </a:p>
@@ -1838,7 +1986,7 @@
           <a:p>
             <a:fld id="{9D5F5360-621C-4463-9F2F-973486E31BC6}" type="datetimeFigureOut">
               <a:rPr lang="en-CA" smtClean="0"/>
-              <a:t>2020-03-30</a:t>
+              <a:t>2021-02-02</a:t>
             </a:fld>
             <a:endParaRPr lang="en-CA"/>
           </a:p>
@@ -1980,7 +2128,7 @@
           <a:p>
             <a:fld id="{9D5F5360-621C-4463-9F2F-973486E31BC6}" type="datetimeFigureOut">
               <a:rPr lang="en-CA" smtClean="0"/>
-              <a:t>2020-03-30</a:t>
+              <a:t>2021-02-02</a:t>
             </a:fld>
             <a:endParaRPr lang="en-CA"/>
           </a:p>
@@ -2093,7 +2241,7 @@
           <a:p>
             <a:fld id="{9D5F5360-621C-4463-9F2F-973486E31BC6}" type="datetimeFigureOut">
               <a:rPr lang="en-CA" smtClean="0"/>
-              <a:t>2020-03-30</a:t>
+              <a:t>2021-02-02</a:t>
             </a:fld>
             <a:endParaRPr lang="en-CA"/>
           </a:p>
@@ -2406,7 +2554,7 @@
           <a:p>
             <a:fld id="{9D5F5360-621C-4463-9F2F-973486E31BC6}" type="datetimeFigureOut">
               <a:rPr lang="en-CA" smtClean="0"/>
-              <a:t>2020-03-30</a:t>
+              <a:t>2021-02-02</a:t>
             </a:fld>
             <a:endParaRPr lang="en-CA"/>
           </a:p>
@@ -2695,7 +2843,7 @@
           <a:p>
             <a:fld id="{9D5F5360-621C-4463-9F2F-973486E31BC6}" type="datetimeFigureOut">
               <a:rPr lang="en-CA" smtClean="0"/>
-              <a:t>2020-03-30</a:t>
+              <a:t>2021-02-02</a:t>
             </a:fld>
             <a:endParaRPr lang="en-CA"/>
           </a:p>
@@ -2938,7 +3086,7 @@
           <a:p>
             <a:fld id="{9D5F5360-621C-4463-9F2F-973486E31BC6}" type="datetimeFigureOut">
               <a:rPr lang="en-CA" smtClean="0"/>
-              <a:t>2020-03-30</a:t>
+              <a:t>2021-02-02</a:t>
             </a:fld>
             <a:endParaRPr lang="en-CA"/>
           </a:p>
@@ -3509,6 +3657,368 @@
 </p:sld>
 </file>
 
+<file path=ppt/slides/slide10.xml><?xml version="1.0" encoding="utf-8"?>
+<p:sld xmlns:a="http://schemas.openxmlformats.org/drawingml/2006/main" xmlns:r="http://schemas.openxmlformats.org/officeDocument/2006/relationships" xmlns:p="http://schemas.openxmlformats.org/presentationml/2006/main">
+  <p:cSld>
+    <p:spTree>
+      <p:nvGrpSpPr>
+        <p:cNvPr id="1" name=""/>
+        <p:cNvGrpSpPr/>
+        <p:nvPr/>
+      </p:nvGrpSpPr>
+      <p:grpSpPr>
+        <a:xfrm>
+          <a:off x="0" y="0"/>
+          <a:ext cx="0" cy="0"/>
+          <a:chOff x="0" y="0"/>
+          <a:chExt cx="0" cy="0"/>
+        </a:xfrm>
+      </p:grpSpPr>
+      <p:pic>
+        <p:nvPicPr>
+          <p:cNvPr id="4" name="Picture 3">
+            <a:extLst>
+              <a:ext uri="{FF2B5EF4-FFF2-40B4-BE49-F238E27FC236}">
+                <a16:creationId xmlns:a16="http://schemas.microsoft.com/office/drawing/2014/main" id="{EADB5A53-BEE7-4E26-BCCA-DCED448DE212}"/>
+              </a:ext>
+            </a:extLst>
+          </p:cNvPr>
+          <p:cNvPicPr>
+            <a:picLocks noChangeAspect="1"/>
+          </p:cNvPicPr>
+          <p:nvPr/>
+        </p:nvPicPr>
+        <p:blipFill rotWithShape="1">
+          <a:blip r:embed="rId2">
+            <a:extLst>
+              <a:ext uri="{28A0092B-C50C-407E-A947-70E740481C1C}">
+                <a14:useLocalDpi xmlns:a14="http://schemas.microsoft.com/office/drawing/2010/main" val="0"/>
+              </a:ext>
+            </a:extLst>
+          </a:blip>
+          <a:srcRect l="14817"/>
+          <a:stretch/>
+        </p:blipFill>
+        <p:spPr>
+          <a:xfrm rot="5400000">
+            <a:off x="1119991" y="-91918"/>
+            <a:ext cx="2352091" cy="4130713"/>
+          </a:xfrm>
+          <a:prstGeom prst="rect">
+            <a:avLst/>
+          </a:prstGeom>
+        </p:spPr>
+      </p:pic>
+      <p:pic>
+        <p:nvPicPr>
+          <p:cNvPr id="5" name="Picture 4">
+            <a:extLst>
+              <a:ext uri="{FF2B5EF4-FFF2-40B4-BE49-F238E27FC236}">
+                <a16:creationId xmlns:a16="http://schemas.microsoft.com/office/drawing/2014/main" id="{DE7DD929-D2EC-4275-9F7B-7D769B8503B5}"/>
+              </a:ext>
+            </a:extLst>
+          </p:cNvPr>
+          <p:cNvPicPr>
+            <a:picLocks noChangeAspect="1"/>
+          </p:cNvPicPr>
+          <p:nvPr/>
+        </p:nvPicPr>
+        <p:blipFill rotWithShape="1">
+          <a:blip r:embed="rId3"/>
+          <a:srcRect t="26334" b="27697"/>
+          <a:stretch/>
+        </p:blipFill>
+        <p:spPr>
+          <a:xfrm>
+            <a:off x="362545" y="3341137"/>
+            <a:ext cx="4364636" cy="689246"/>
+          </a:xfrm>
+          <a:prstGeom prst="rect">
+            <a:avLst/>
+          </a:prstGeom>
+        </p:spPr>
+      </p:pic>
+      <p:cxnSp>
+        <p:nvCxnSpPr>
+          <p:cNvPr id="11" name="Straight Arrow Connector 10">
+            <a:extLst>
+              <a:ext uri="{FF2B5EF4-FFF2-40B4-BE49-F238E27FC236}">
+                <a16:creationId xmlns:a16="http://schemas.microsoft.com/office/drawing/2014/main" id="{52DF43D8-009F-41C6-93E5-79483F5946AE}"/>
+              </a:ext>
+            </a:extLst>
+          </p:cNvPr>
+          <p:cNvCxnSpPr>
+            <a:cxnSpLocks/>
+          </p:cNvCxnSpPr>
+          <p:nvPr/>
+        </p:nvCxnSpPr>
+        <p:spPr>
+          <a:xfrm flipH="1">
+            <a:off x="362546" y="1973439"/>
+            <a:ext cx="1831249" cy="1662846"/>
+          </a:xfrm>
+          <a:prstGeom prst="straightConnector1">
+            <a:avLst/>
+          </a:prstGeom>
+          <a:ln>
+            <a:tailEnd type="triangle"/>
+          </a:ln>
+        </p:spPr>
+        <p:style>
+          <a:lnRef idx="1">
+            <a:schemeClr val="accent1"/>
+          </a:lnRef>
+          <a:fillRef idx="0">
+            <a:schemeClr val="accent1"/>
+          </a:fillRef>
+          <a:effectRef idx="0">
+            <a:schemeClr val="accent1"/>
+          </a:effectRef>
+          <a:fontRef idx="minor">
+            <a:schemeClr val="tx1"/>
+          </a:fontRef>
+        </p:style>
+      </p:cxnSp>
+      <p:cxnSp>
+        <p:nvCxnSpPr>
+          <p:cNvPr id="13" name="Straight Arrow Connector 12">
+            <a:extLst>
+              <a:ext uri="{FF2B5EF4-FFF2-40B4-BE49-F238E27FC236}">
+                <a16:creationId xmlns:a16="http://schemas.microsoft.com/office/drawing/2014/main" id="{DD26DC2D-68B0-4C3C-8C25-111C2CC2EE88}"/>
+              </a:ext>
+            </a:extLst>
+          </p:cNvPr>
+          <p:cNvCxnSpPr>
+            <a:cxnSpLocks/>
+          </p:cNvCxnSpPr>
+          <p:nvPr/>
+        </p:nvCxnSpPr>
+        <p:spPr>
+          <a:xfrm>
+            <a:off x="2259728" y="1973439"/>
+            <a:ext cx="2467453" cy="1662846"/>
+          </a:xfrm>
+          <a:prstGeom prst="straightConnector1">
+            <a:avLst/>
+          </a:prstGeom>
+          <a:ln>
+            <a:tailEnd type="triangle"/>
+          </a:ln>
+        </p:spPr>
+        <p:style>
+          <a:lnRef idx="1">
+            <a:schemeClr val="accent1"/>
+          </a:lnRef>
+          <a:fillRef idx="0">
+            <a:schemeClr val="accent1"/>
+          </a:fillRef>
+          <a:effectRef idx="0">
+            <a:schemeClr val="accent1"/>
+          </a:effectRef>
+          <a:fontRef idx="minor">
+            <a:schemeClr val="tx1"/>
+          </a:fontRef>
+        </p:style>
+      </p:cxnSp>
+      <p:pic>
+        <p:nvPicPr>
+          <p:cNvPr id="1028" name="Picture 4">
+            <a:extLst>
+              <a:ext uri="{FF2B5EF4-FFF2-40B4-BE49-F238E27FC236}">
+                <a16:creationId xmlns:a16="http://schemas.microsoft.com/office/drawing/2014/main" id="{29C020B2-EC70-4B5D-86FF-6DB8F897DDEC}"/>
+              </a:ext>
+            </a:extLst>
+          </p:cNvPr>
+          <p:cNvPicPr>
+            <a:picLocks noChangeAspect="1" noChangeArrowheads="1"/>
+          </p:cNvPicPr>
+          <p:nvPr/>
+        </p:nvPicPr>
+        <p:blipFill>
+          <a:blip r:embed="rId4">
+            <a:extLst>
+              <a:ext uri="{28A0092B-C50C-407E-A947-70E740481C1C}">
+                <a14:useLocalDpi xmlns:a14="http://schemas.microsoft.com/office/drawing/2010/main" val="0"/>
+              </a:ext>
+            </a:extLst>
+          </a:blip>
+          <a:srcRect/>
+          <a:stretch>
+            <a:fillRect/>
+          </a:stretch>
+        </p:blipFill>
+        <p:spPr bwMode="auto">
+          <a:xfrm>
+            <a:off x="4851982" y="676095"/>
+            <a:ext cx="7109338" cy="3653309"/>
+          </a:xfrm>
+          <a:prstGeom prst="rect">
+            <a:avLst/>
+          </a:prstGeom>
+          <a:noFill/>
+          <a:extLst>
+            <a:ext uri="{909E8E84-426E-40DD-AFC4-6F175D3DCCD1}">
+              <a14:hiddenFill xmlns:a14="http://schemas.microsoft.com/office/drawing/2010/main">
+                <a:solidFill>
+                  <a:srgbClr val="FFFFFF"/>
+                </a:solidFill>
+              </a14:hiddenFill>
+            </a:ext>
+          </a:extLst>
+        </p:spPr>
+      </p:pic>
+      <p:pic>
+        <p:nvPicPr>
+          <p:cNvPr id="1038" name="Picture 14">
+            <a:extLst>
+              <a:ext uri="{FF2B5EF4-FFF2-40B4-BE49-F238E27FC236}">
+                <a16:creationId xmlns:a16="http://schemas.microsoft.com/office/drawing/2014/main" id="{49D96BC2-1B4D-4CEC-B9D6-5260B7F776E4}"/>
+              </a:ext>
+            </a:extLst>
+          </p:cNvPr>
+          <p:cNvPicPr>
+            <a:picLocks noChangeAspect="1" noChangeArrowheads="1"/>
+          </p:cNvPicPr>
+          <p:nvPr/>
+        </p:nvPicPr>
+        <p:blipFill>
+          <a:blip r:embed="rId5">
+            <a:extLst>
+              <a:ext uri="{28A0092B-C50C-407E-A947-70E740481C1C}">
+                <a14:useLocalDpi xmlns:a14="http://schemas.microsoft.com/office/drawing/2010/main" val="0"/>
+              </a:ext>
+            </a:extLst>
+          </a:blip>
+          <a:srcRect/>
+          <a:stretch>
+            <a:fillRect/>
+          </a:stretch>
+        </p:blipFill>
+        <p:spPr bwMode="auto">
+          <a:xfrm>
+            <a:off x="7045098" y="874887"/>
+            <a:ext cx="3457575" cy="2409825"/>
+          </a:xfrm>
+          <a:prstGeom prst="rect">
+            <a:avLst/>
+          </a:prstGeom>
+          <a:noFill/>
+          <a:extLst>
+            <a:ext uri="{909E8E84-426E-40DD-AFC4-6F175D3DCCD1}">
+              <a14:hiddenFill xmlns:a14="http://schemas.microsoft.com/office/drawing/2010/main">
+                <a:solidFill>
+                  <a:srgbClr val="FFFFFF"/>
+                </a:solidFill>
+              </a14:hiddenFill>
+            </a:ext>
+          </a:extLst>
+        </p:spPr>
+      </p:pic>
+      <p:sp>
+        <p:nvSpPr>
+          <p:cNvPr id="19" name="Rectangle 18">
+            <a:extLst>
+              <a:ext uri="{FF2B5EF4-FFF2-40B4-BE49-F238E27FC236}">
+                <a16:creationId xmlns:a16="http://schemas.microsoft.com/office/drawing/2014/main" id="{C0555634-86FA-4B26-BCB3-6D13FB1146B4}"/>
+              </a:ext>
+            </a:extLst>
+          </p:cNvPr>
+          <p:cNvSpPr/>
+          <p:nvPr/>
+        </p:nvSpPr>
+        <p:spPr>
+          <a:xfrm>
+            <a:off x="10620462" y="3341137"/>
+            <a:ext cx="902844" cy="475083"/>
+          </a:xfrm>
+          <a:prstGeom prst="rect">
+            <a:avLst/>
+          </a:prstGeom>
+          <a:noFill/>
+          <a:ln>
+            <a:prstDash val="dash"/>
+          </a:ln>
+        </p:spPr>
+        <p:style>
+          <a:lnRef idx="2">
+            <a:schemeClr val="accent1">
+              <a:shade val="50000"/>
+            </a:schemeClr>
+          </a:lnRef>
+          <a:fillRef idx="1">
+            <a:schemeClr val="accent1"/>
+          </a:fillRef>
+          <a:effectRef idx="0">
+            <a:schemeClr val="accent1"/>
+          </a:effectRef>
+          <a:fontRef idx="minor">
+            <a:schemeClr val="lt1"/>
+          </a:fontRef>
+        </p:style>
+        <p:txBody>
+          <a:bodyPr rtlCol="0" anchor="ctr"/>
+          <a:lstStyle/>
+          <a:p>
+            <a:pPr algn="ctr"/>
+            <a:endParaRPr lang="en-CA"/>
+          </a:p>
+        </p:txBody>
+      </p:sp>
+      <p:cxnSp>
+        <p:nvCxnSpPr>
+          <p:cNvPr id="29" name="Connector: Elbow 28">
+            <a:extLst>
+              <a:ext uri="{FF2B5EF4-FFF2-40B4-BE49-F238E27FC236}">
+                <a16:creationId xmlns:a16="http://schemas.microsoft.com/office/drawing/2014/main" id="{D3FEE3DE-013D-4F9C-9541-F6A5CDF3C5E2}"/>
+              </a:ext>
+            </a:extLst>
+          </p:cNvPr>
+          <p:cNvCxnSpPr>
+            <a:cxnSpLocks/>
+            <a:endCxn id="1038" idx="3"/>
+          </p:cNvCxnSpPr>
+          <p:nvPr/>
+        </p:nvCxnSpPr>
+        <p:spPr>
+          <a:xfrm rot="16200000" flipV="1">
+            <a:off x="10161598" y="2420875"/>
+            <a:ext cx="1261338" cy="579187"/>
+          </a:xfrm>
+          <a:prstGeom prst="bentConnector2">
+            <a:avLst/>
+          </a:prstGeom>
+          <a:ln>
+            <a:tailEnd type="triangle"/>
+          </a:ln>
+        </p:spPr>
+        <p:style>
+          <a:lnRef idx="1">
+            <a:schemeClr val="accent1"/>
+          </a:lnRef>
+          <a:fillRef idx="0">
+            <a:schemeClr val="accent1"/>
+          </a:fillRef>
+          <a:effectRef idx="0">
+            <a:schemeClr val="accent1"/>
+          </a:effectRef>
+          <a:fontRef idx="minor">
+            <a:schemeClr val="tx1"/>
+          </a:fontRef>
+        </p:style>
+      </p:cxnSp>
+    </p:spTree>
+    <p:extLst>
+      <p:ext uri="{BB962C8B-B14F-4D97-AF65-F5344CB8AC3E}">
+        <p14:creationId xmlns:p14="http://schemas.microsoft.com/office/powerpoint/2010/main" val="233214969"/>
+      </p:ext>
+    </p:extLst>
+  </p:cSld>
+  <p:clrMapOvr>
+    <a:masterClrMapping/>
+  </p:clrMapOvr>
+</p:sld>
+</file>
+
 <file path=ppt/slides/slide2.xml><?xml version="1.0" encoding="utf-8"?>
 <p:sld xmlns:a="http://schemas.openxmlformats.org/drawingml/2006/main" xmlns:r="http://schemas.openxmlformats.org/officeDocument/2006/relationships" xmlns:p="http://schemas.openxmlformats.org/presentationml/2006/main">
   <p:cSld>
@@ -4282,12 +4792,58 @@
           </a:prstGeom>
         </p:spPr>
       </p:pic>
+      <p:cxnSp>
+        <p:nvCxnSpPr>
+          <p:cNvPr id="6" name="Connector: Elbow 5">
+            <a:extLst>
+              <a:ext uri="{FF2B5EF4-FFF2-40B4-BE49-F238E27FC236}">
+                <a16:creationId xmlns:a16="http://schemas.microsoft.com/office/drawing/2014/main" id="{A4385DC2-F6FA-4330-B028-FB4D6AE810D6}"/>
+              </a:ext>
+            </a:extLst>
+          </p:cNvPr>
+          <p:cNvCxnSpPr>
+            <a:cxnSpLocks/>
+          </p:cNvCxnSpPr>
+          <p:nvPr/>
+        </p:nvCxnSpPr>
+        <p:spPr>
+          <a:xfrm rot="16200000" flipH="1">
+            <a:off x="4984861" y="2817990"/>
+            <a:ext cx="1846555" cy="331434"/>
+          </a:xfrm>
+          <a:prstGeom prst="bentConnector3">
+            <a:avLst>
+              <a:gd name="adj1" fmla="val 963"/>
+            </a:avLst>
+          </a:prstGeom>
+          <a:ln w="19050">
+            <a:solidFill>
+              <a:schemeClr val="tx1"/>
+            </a:solidFill>
+            <a:tailEnd type="triangle"/>
+          </a:ln>
+        </p:spPr>
+        <p:style>
+          <a:lnRef idx="1">
+            <a:schemeClr val="accent1"/>
+          </a:lnRef>
+          <a:fillRef idx="0">
+            <a:schemeClr val="accent1"/>
+          </a:fillRef>
+          <a:effectRef idx="0">
+            <a:schemeClr val="accent1"/>
+          </a:effectRef>
+          <a:fontRef idx="minor">
+            <a:schemeClr val="tx1"/>
+          </a:fontRef>
+        </p:style>
+      </p:cxnSp>
       <p:pic>
         <p:nvPicPr>
-          <p:cNvPr id="5" name="Picture 4">
-            <a:extLst>
-              <a:ext uri="{FF2B5EF4-FFF2-40B4-BE49-F238E27FC236}">
-                <a16:creationId xmlns:a16="http://schemas.microsoft.com/office/drawing/2014/main" id="{77747B92-B550-47F2-8286-995D8DCC58E2}"/>
+          <p:cNvPr id="7" name="Picture 6">
+            <a:extLst>
+              <a:ext uri="{FF2B5EF4-FFF2-40B4-BE49-F238E27FC236}">
+                <a16:creationId xmlns:a16="http://schemas.microsoft.com/office/drawing/2014/main" id="{ED33DD30-6B4E-4292-A7A1-316EB4C2C526}"/>
               </a:ext>
             </a:extLst>
           </p:cNvPr>
@@ -4304,175 +4860,14 @@
         </p:blipFill>
         <p:spPr>
           <a:xfrm>
-            <a:off x="4417697" y="4036292"/>
-            <a:ext cx="2478402" cy="2183388"/>
+            <a:off x="4063079" y="3906985"/>
+            <a:ext cx="3358684" cy="2631509"/>
           </a:xfrm>
           <a:prstGeom prst="rect">
             <a:avLst/>
           </a:prstGeom>
-          <a:ln>
-            <a:noFill/>
-          </a:ln>
-          <a:effectLst>
-            <a:outerShdw blurRad="292100" dist="139700" dir="2700000" algn="tl" rotWithShape="0">
-              <a:srgbClr val="333333">
-                <a:alpha val="65000"/>
-              </a:srgbClr>
-            </a:outerShdw>
-          </a:effectLst>
         </p:spPr>
       </p:pic>
-      <p:cxnSp>
-        <p:nvCxnSpPr>
-          <p:cNvPr id="6" name="Connector: Elbow 5">
-            <a:extLst>
-              <a:ext uri="{FF2B5EF4-FFF2-40B4-BE49-F238E27FC236}">
-                <a16:creationId xmlns:a16="http://schemas.microsoft.com/office/drawing/2014/main" id="{A4385DC2-F6FA-4330-B028-FB4D6AE810D6}"/>
-              </a:ext>
-            </a:extLst>
-          </p:cNvPr>
-          <p:cNvCxnSpPr>
-            <a:cxnSpLocks/>
-          </p:cNvCxnSpPr>
-          <p:nvPr/>
-        </p:nvCxnSpPr>
-        <p:spPr>
-          <a:xfrm rot="16200000" flipH="1">
-            <a:off x="4984861" y="2817990"/>
-            <a:ext cx="1846555" cy="331434"/>
-          </a:xfrm>
-          <a:prstGeom prst="bentConnector3">
-            <a:avLst>
-              <a:gd name="adj1" fmla="val 963"/>
-            </a:avLst>
-          </a:prstGeom>
-          <a:ln w="19050">
-            <a:solidFill>
-              <a:schemeClr val="tx1"/>
-            </a:solidFill>
-            <a:tailEnd type="triangle"/>
-          </a:ln>
-        </p:spPr>
-        <p:style>
-          <a:lnRef idx="1">
-            <a:schemeClr val="accent1"/>
-          </a:lnRef>
-          <a:fillRef idx="0">
-            <a:schemeClr val="accent1"/>
-          </a:fillRef>
-          <a:effectRef idx="0">
-            <a:schemeClr val="accent1"/>
-          </a:effectRef>
-          <a:fontRef idx="minor">
-            <a:schemeClr val="tx1"/>
-          </a:fontRef>
-        </p:style>
-      </p:cxnSp>
-      <p:sp>
-        <p:nvSpPr>
-          <p:cNvPr id="8" name="TextBox 7">
-            <a:extLst>
-              <a:ext uri="{FF2B5EF4-FFF2-40B4-BE49-F238E27FC236}">
-                <a16:creationId xmlns:a16="http://schemas.microsoft.com/office/drawing/2014/main" id="{4ECF0F7D-AD3B-4DB8-B013-EA55D2526365}"/>
-              </a:ext>
-            </a:extLst>
-          </p:cNvPr>
-          <p:cNvSpPr txBox="1"/>
-          <p:nvPr/>
-        </p:nvSpPr>
-        <p:spPr>
-          <a:xfrm>
-            <a:off x="4504827" y="4036292"/>
-            <a:ext cx="393055" cy="369332"/>
-          </a:xfrm>
-          <a:prstGeom prst="rect">
-            <a:avLst/>
-          </a:prstGeom>
-          <a:noFill/>
-        </p:spPr>
-        <p:txBody>
-          <a:bodyPr wrap="square" rtlCol="0">
-            <a:spAutoFit/>
-          </a:bodyPr>
-          <a:lstStyle/>
-          <a:p>
-            <a:r>
-              <a:rPr lang="en-CA" dirty="0"/>
-              <a:t>a)</a:t>
-            </a:r>
-          </a:p>
-        </p:txBody>
-      </p:sp>
-      <p:sp>
-        <p:nvSpPr>
-          <p:cNvPr id="9" name="TextBox 8">
-            <a:extLst>
-              <a:ext uri="{FF2B5EF4-FFF2-40B4-BE49-F238E27FC236}">
-                <a16:creationId xmlns:a16="http://schemas.microsoft.com/office/drawing/2014/main" id="{AC730AB3-492C-4BA0-B9BA-CF169655F2D3}"/>
-              </a:ext>
-            </a:extLst>
-          </p:cNvPr>
-          <p:cNvSpPr txBox="1"/>
-          <p:nvPr/>
-        </p:nvSpPr>
-        <p:spPr>
-          <a:xfrm>
-            <a:off x="5188317" y="4036292"/>
-            <a:ext cx="393055" cy="369332"/>
-          </a:xfrm>
-          <a:prstGeom prst="rect">
-            <a:avLst/>
-          </a:prstGeom>
-          <a:noFill/>
-        </p:spPr>
-        <p:txBody>
-          <a:bodyPr wrap="square" rtlCol="0">
-            <a:spAutoFit/>
-          </a:bodyPr>
-          <a:lstStyle/>
-          <a:p>
-            <a:r>
-              <a:rPr lang="en-CA" dirty="0"/>
-              <a:t>b)</a:t>
-            </a:r>
-          </a:p>
-        </p:txBody>
-      </p:sp>
-      <p:sp>
-        <p:nvSpPr>
-          <p:cNvPr id="10" name="TextBox 9">
-            <a:extLst>
-              <a:ext uri="{FF2B5EF4-FFF2-40B4-BE49-F238E27FC236}">
-                <a16:creationId xmlns:a16="http://schemas.microsoft.com/office/drawing/2014/main" id="{0E8BF341-1E0F-4CD1-B0B0-C20FB57D1F08}"/>
-              </a:ext>
-            </a:extLst>
-          </p:cNvPr>
-          <p:cNvSpPr txBox="1"/>
-          <p:nvPr/>
-        </p:nvSpPr>
-        <p:spPr>
-          <a:xfrm>
-            <a:off x="5908138" y="4036292"/>
-            <a:ext cx="393055" cy="369332"/>
-          </a:xfrm>
-          <a:prstGeom prst="rect">
-            <a:avLst/>
-          </a:prstGeom>
-          <a:noFill/>
-        </p:spPr>
-        <p:txBody>
-          <a:bodyPr wrap="square" rtlCol="0">
-            <a:spAutoFit/>
-          </a:bodyPr>
-          <a:lstStyle/>
-          <a:p>
-            <a:r>
-              <a:rPr lang="en-CA" dirty="0"/>
-              <a:t>c)</a:t>
-            </a:r>
-          </a:p>
-        </p:txBody>
-      </p:sp>
     </p:spTree>
     <p:extLst>
       <p:ext uri="{BB962C8B-B14F-4D97-AF65-F5344CB8AC3E}">
@@ -8731,13 +9126,13 @@
               </a:ext>
             </a:extLst>
           </a:blip>
-          <a:srcRect l="16544" t="42881" b="30549"/>
+          <a:srcRect l="16544" t="42881" b="39041"/>
           <a:stretch/>
         </p:blipFill>
         <p:spPr bwMode="auto">
           <a:xfrm>
             <a:off x="2229975" y="1329860"/>
-            <a:ext cx="6375643" cy="1522398"/>
+            <a:ext cx="6375643" cy="1035835"/>
           </a:xfrm>
           <a:prstGeom prst="rect">
             <a:avLst/>
@@ -8776,13 +9171,13 @@
               </a:ext>
             </a:extLst>
           </a:blip>
-          <a:srcRect l="7376" t="26823" r="153" b="43733"/>
+          <a:srcRect l="7376" t="26823" r="153" b="51136"/>
           <a:stretch/>
         </p:blipFill>
         <p:spPr bwMode="auto">
           <a:xfrm>
-            <a:off x="2230684" y="3352691"/>
-            <a:ext cx="6374934" cy="1522398"/>
+            <a:off x="2230684" y="2664793"/>
+            <a:ext cx="6374934" cy="1139615"/>
           </a:xfrm>
           <a:prstGeom prst="rect">
             <a:avLst/>
@@ -8813,7 +9208,7 @@
         </p:nvSpPr>
         <p:spPr>
           <a:xfrm>
-            <a:off x="2229974" y="2839530"/>
+            <a:off x="2229973" y="1994903"/>
             <a:ext cx="393055" cy="307777"/>
           </a:xfrm>
           <a:prstGeom prst="rect">
@@ -8828,7 +9223,11 @@
           <a:lstStyle/>
           <a:p>
             <a:r>
-              <a:rPr lang="en-CA" sz="1400" dirty="0"/>
+              <a:rPr lang="en-CA" sz="1400" dirty="0">
+                <a:solidFill>
+                  <a:srgbClr val="FF0000"/>
+                </a:solidFill>
+              </a:rPr>
               <a:t>a)</a:t>
             </a:r>
           </a:p>
@@ -8848,7 +9247,7 @@
         </p:nvSpPr>
         <p:spPr>
           <a:xfrm>
-            <a:off x="2229974" y="4875089"/>
+            <a:off x="2229974" y="3470042"/>
             <a:ext cx="393055" cy="307777"/>
           </a:xfrm>
           <a:prstGeom prst="rect">
@@ -8863,7 +9262,11 @@
           <a:lstStyle/>
           <a:p>
             <a:r>
-              <a:rPr lang="en-CA" sz="1400" dirty="0"/>
+              <a:rPr lang="en-CA" sz="1400" dirty="0">
+                <a:solidFill>
+                  <a:srgbClr val="FF0000"/>
+                </a:solidFill>
+              </a:rPr>
               <a:t>b)</a:t>
             </a:r>
           </a:p>

</xml_diff>

<commit_message>
updated figures 1 and 2
</commit_message>
<xml_diff>
--- a/Images/needlefab.pptx
+++ b/Images/needlefab.pptx
@@ -124,7 +124,7 @@
 <file path=ppt/revisionInfo.xml><?xml version="1.0" encoding="utf-8"?>
 <p1510:revInfo xmlns:a="http://schemas.openxmlformats.org/drawingml/2006/main" xmlns:r="http://schemas.openxmlformats.org/officeDocument/2006/relationships" xmlns:p1510="http://schemas.microsoft.com/office/powerpoint/2015/10/main">
   <p1510:revLst>
-    <p1510:client id="{ADD493D8-69BA-470A-B53A-2BD2F4ADACA3}" v="1" dt="2021-02-02T22:04:17.394"/>
+    <p1510:client id="{3A2BF2C0-9ABA-4031-8A52-BDF97D4C6608}" v="3" dt="2021-04-16T19:56:03.262"/>
   </p1510:revLst>
 </p1510:revInfo>
 </file>
@@ -150,6 +150,45 @@
             <pc:docMk/>
             <pc:sldMk cId="233214969" sldId="265"/>
             <ac:picMk id="10" creationId="{DCC0D645-85AE-4F73-ABEA-0097EA960FAE}"/>
+          </ac:picMkLst>
+        </pc:picChg>
+      </pc:sldChg>
+    </pc:docChg>
+  </pc:docChgLst>
+  <pc:docChgLst>
+    <pc:chgData name="Nikhil Kotibhaskar" userId="ae3badbd-7aaf-41d7-bf37-a015832cbfa1" providerId="ADAL" clId="{3A2BF2C0-9ABA-4031-8A52-BDF97D4C6608}"/>
+    <pc:docChg chg="modSld">
+      <pc:chgData name="Nikhil Kotibhaskar" userId="ae3badbd-7aaf-41d7-bf37-a015832cbfa1" providerId="ADAL" clId="{3A2BF2C0-9ABA-4031-8A52-BDF97D4C6608}" dt="2021-04-16T19:56:03.262" v="2" actId="1076"/>
+      <pc:docMkLst>
+        <pc:docMk/>
+      </pc:docMkLst>
+      <pc:sldChg chg="modSp">
+        <pc:chgData name="Nikhil Kotibhaskar" userId="ae3badbd-7aaf-41d7-bf37-a015832cbfa1" providerId="ADAL" clId="{3A2BF2C0-9ABA-4031-8A52-BDF97D4C6608}" dt="2021-04-16T19:56:03.262" v="2" actId="1076"/>
+        <pc:sldMkLst>
+          <pc:docMk/>
+          <pc:sldMk cId="3703919774" sldId="262"/>
+        </pc:sldMkLst>
+        <pc:picChg chg="mod">
+          <ac:chgData name="Nikhil Kotibhaskar" userId="ae3badbd-7aaf-41d7-bf37-a015832cbfa1" providerId="ADAL" clId="{3A2BF2C0-9ABA-4031-8A52-BDF97D4C6608}" dt="2021-04-16T19:56:03.262" v="2" actId="1076"/>
+          <ac:picMkLst>
+            <pc:docMk/>
+            <pc:sldMk cId="3703919774" sldId="262"/>
+            <ac:picMk id="4" creationId="{E946925A-52AC-4515-9DC6-45DD27EEF64A}"/>
+          </ac:picMkLst>
+        </pc:picChg>
+      </pc:sldChg>
+      <pc:sldChg chg="modSp">
+        <pc:chgData name="Nikhil Kotibhaskar" userId="ae3badbd-7aaf-41d7-bf37-a015832cbfa1" providerId="ADAL" clId="{3A2BF2C0-9ABA-4031-8A52-BDF97D4C6608}" dt="2021-04-16T19:47:36.861" v="1" actId="1076"/>
+        <pc:sldMkLst>
+          <pc:docMk/>
+          <pc:sldMk cId="1111114484" sldId="263"/>
+        </pc:sldMkLst>
+        <pc:picChg chg="mod">
+          <ac:chgData name="Nikhil Kotibhaskar" userId="ae3badbd-7aaf-41d7-bf37-a015832cbfa1" providerId="ADAL" clId="{3A2BF2C0-9ABA-4031-8A52-BDF97D4C6608}" dt="2021-04-16T19:47:36.861" v="1" actId="1076"/>
+          <ac:picMkLst>
+            <pc:docMk/>
+            <pc:sldMk cId="1111114484" sldId="263"/>
+            <ac:picMk id="4" creationId="{A56E6CE9-5996-4E3C-924F-A6337CD3FAB0}"/>
           </ac:picMkLst>
         </pc:picChg>
       </pc:sldChg>
@@ -417,7 +456,7 @@
           <a:p>
             <a:fld id="{9D5F5360-621C-4463-9F2F-973486E31BC6}" type="datetimeFigureOut">
               <a:rPr lang="en-CA" smtClean="0"/>
-              <a:t>2021-02-02</a:t>
+              <a:t>2021-04-16</a:t>
             </a:fld>
             <a:endParaRPr lang="en-CA"/>
           </a:p>
@@ -617,7 +656,7 @@
           <a:p>
             <a:fld id="{9D5F5360-621C-4463-9F2F-973486E31BC6}" type="datetimeFigureOut">
               <a:rPr lang="en-CA" smtClean="0"/>
-              <a:t>2021-02-02</a:t>
+              <a:t>2021-04-16</a:t>
             </a:fld>
             <a:endParaRPr lang="en-CA"/>
           </a:p>
@@ -827,7 +866,7 @@
           <a:p>
             <a:fld id="{9D5F5360-621C-4463-9F2F-973486E31BC6}" type="datetimeFigureOut">
               <a:rPr lang="en-CA" smtClean="0"/>
-              <a:t>2021-02-02</a:t>
+              <a:t>2021-04-16</a:t>
             </a:fld>
             <a:endParaRPr lang="en-CA"/>
           </a:p>
@@ -1027,7 +1066,7 @@
           <a:p>
             <a:fld id="{9D5F5360-621C-4463-9F2F-973486E31BC6}" type="datetimeFigureOut">
               <a:rPr lang="en-CA" smtClean="0"/>
-              <a:t>2021-02-02</a:t>
+              <a:t>2021-04-16</a:t>
             </a:fld>
             <a:endParaRPr lang="en-CA"/>
           </a:p>
@@ -1303,7 +1342,7 @@
           <a:p>
             <a:fld id="{9D5F5360-621C-4463-9F2F-973486E31BC6}" type="datetimeFigureOut">
               <a:rPr lang="en-CA" smtClean="0"/>
-              <a:t>2021-02-02</a:t>
+              <a:t>2021-04-16</a:t>
             </a:fld>
             <a:endParaRPr lang="en-CA"/>
           </a:p>
@@ -1571,7 +1610,7 @@
           <a:p>
             <a:fld id="{9D5F5360-621C-4463-9F2F-973486E31BC6}" type="datetimeFigureOut">
               <a:rPr lang="en-CA" smtClean="0"/>
-              <a:t>2021-02-02</a:t>
+              <a:t>2021-04-16</a:t>
             </a:fld>
             <a:endParaRPr lang="en-CA"/>
           </a:p>
@@ -1986,7 +2025,7 @@
           <a:p>
             <a:fld id="{9D5F5360-621C-4463-9F2F-973486E31BC6}" type="datetimeFigureOut">
               <a:rPr lang="en-CA" smtClean="0"/>
-              <a:t>2021-02-02</a:t>
+              <a:t>2021-04-16</a:t>
             </a:fld>
             <a:endParaRPr lang="en-CA"/>
           </a:p>
@@ -2128,7 +2167,7 @@
           <a:p>
             <a:fld id="{9D5F5360-621C-4463-9F2F-973486E31BC6}" type="datetimeFigureOut">
               <a:rPr lang="en-CA" smtClean="0"/>
-              <a:t>2021-02-02</a:t>
+              <a:t>2021-04-16</a:t>
             </a:fld>
             <a:endParaRPr lang="en-CA"/>
           </a:p>
@@ -2241,7 +2280,7 @@
           <a:p>
             <a:fld id="{9D5F5360-621C-4463-9F2F-973486E31BC6}" type="datetimeFigureOut">
               <a:rPr lang="en-CA" smtClean="0"/>
-              <a:t>2021-02-02</a:t>
+              <a:t>2021-04-16</a:t>
             </a:fld>
             <a:endParaRPr lang="en-CA"/>
           </a:p>
@@ -2554,7 +2593,7 @@
           <a:p>
             <a:fld id="{9D5F5360-621C-4463-9F2F-973486E31BC6}" type="datetimeFigureOut">
               <a:rPr lang="en-CA" smtClean="0"/>
-              <a:t>2021-02-02</a:t>
+              <a:t>2021-04-16</a:t>
             </a:fld>
             <a:endParaRPr lang="en-CA"/>
           </a:p>
@@ -2843,7 +2882,7 @@
           <a:p>
             <a:fld id="{9D5F5360-621C-4463-9F2F-973486E31BC6}" type="datetimeFigureOut">
               <a:rPr lang="en-CA" smtClean="0"/>
-              <a:t>2021-02-02</a:t>
+              <a:t>2021-04-16</a:t>
             </a:fld>
             <a:endParaRPr lang="en-CA"/>
           </a:p>
@@ -3086,7 +3125,7 @@
           <a:p>
             <a:fld id="{9D5F5360-621C-4463-9F2F-973486E31BC6}" type="datetimeFigureOut">
               <a:rPr lang="en-CA" smtClean="0"/>
-              <a:t>2021-02-02</a:t>
+              <a:t>2021-04-16</a:t>
             </a:fld>
             <a:endParaRPr lang="en-CA"/>
           </a:p>
@@ -9131,7 +9170,7 @@
         </p:blipFill>
         <p:spPr bwMode="auto">
           <a:xfrm>
-            <a:off x="2229975" y="1329860"/>
+            <a:off x="2230329" y="827541"/>
             <a:ext cx="6375643" cy="1035835"/>
           </a:xfrm>
           <a:prstGeom prst="rect">

</xml_diff>